<commit_message>
[ay-2022-23] updated guides (drafted info abount exam)
</commit_message>
<xml_diff>
--- a/guides/project_delivery_instructions.pptx
+++ b/guides/project_delivery_instructions.pptx
@@ -204,7 +204,7 @@
           <a:p>
             <a:fld id="{81C4B3FE-0320-8142-8396-5C3025C019EC}" type="datetimeFigureOut">
               <a:rPr lang="en-IT" smtClean="0"/>
-              <a:t>22/06/22</a:t>
+              <a:t>15/11/22</a:t>
             </a:fld>
             <a:endParaRPr lang="en-IT"/>
           </a:p>
@@ -2126,7 +2126,7 @@
             </a:pPr>
             <a:r>
               <a:rPr lang="it-IT" sz="2800" dirty="0"/>
-              <a:t>A.Y. 2021-2022</a:t>
+              <a:t>A.Y. 2022-2023</a:t>
             </a:r>
           </a:p>
         </p:txBody>

</xml_diff>